<commit_message>
Agrego primera clase modificada
</commit_message>
<xml_diff>
--- a/clase_1/Clase1.pptx
+++ b/clase_1/Clase1.pptx
@@ -623,7 +623,7 @@
           <a:p>
             <a:fld id="{1D8BD707-D9CF-40AE-B4C6-C98DA3205C09}" type="datetimeFigureOut">
               <a:rPr lang="en-US"/>
-              <a:t>3/5/2022</a:t>
+              <a:t>4/29/2022</a:t>
             </a:fld>
             <a:endParaRPr lang="en-US"/>
           </a:p>
@@ -800,7 +800,7 @@
           <a:p>
             <a:fld id="{1D8BD707-D9CF-40AE-B4C6-C98DA3205C09}" type="datetimeFigureOut">
               <a:rPr lang="en-US"/>
-              <a:t>3/5/2022</a:t>
+              <a:t>4/29/2022</a:t>
             </a:fld>
             <a:endParaRPr lang="en-US"/>
           </a:p>
@@ -1014,7 +1014,7 @@
           <a:p>
             <a:fld id="{1D8BD707-D9CF-40AE-B4C6-C98DA3205C09}" type="datetimeFigureOut">
               <a:rPr lang="en-US"/>
-              <a:t>3/5/2022</a:t>
+              <a:t>4/29/2022</a:t>
             </a:fld>
             <a:endParaRPr lang="en-US"/>
           </a:p>
@@ -1162,7 +1162,7 @@
           <a:p>
             <a:fld id="{1D8BD707-D9CF-40AE-B4C6-C98DA3205C09}" type="datetimeFigureOut">
               <a:rPr lang="en-US"/>
-              <a:t>3/5/2022</a:t>
+              <a:t>4/29/2022</a:t>
             </a:fld>
             <a:endParaRPr lang="en-US"/>
           </a:p>
@@ -1281,7 +1281,7 @@
           <a:p>
             <a:fld id="{1D8BD707-D9CF-40AE-B4C6-C98DA3205C09}" type="datetimeFigureOut">
               <a:rPr lang="en-US"/>
-              <a:t>3/5/2022</a:t>
+              <a:t>4/29/2022</a:t>
             </a:fld>
             <a:endParaRPr lang="en-US"/>
           </a:p>
@@ -1628,7 +1628,7 @@
           <a:p>
             <a:fld id="{1D8BD707-D9CF-40AE-B4C6-C98DA3205C09}" type="datetimeFigureOut">
               <a:rPr lang="en-US"/>
-              <a:t>3/5/2022</a:t>
+              <a:t>4/29/2022</a:t>
             </a:fld>
             <a:endParaRPr lang="en-US"/>
           </a:p>
@@ -1963,7 +1963,7 @@
               </a:spcBef>
             </a:pPr>
             <a:r>
-              <a:rPr sz="1800" spc="30" dirty="0">
+              <a:rPr sz="1800" spc="30" dirty="0" err="1">
                 <a:solidFill>
                   <a:srgbClr val="FFFFFF"/>
                 </a:solidFill>
@@ -1973,7 +1973,7 @@
               <a:t>Clas</a:t>
             </a:r>
             <a:r>
-              <a:rPr sz="1800" spc="45" dirty="0">
+              <a:rPr sz="1800" spc="45" dirty="0" err="1">
                 <a:solidFill>
                   <a:srgbClr val="FFFFFF"/>
                 </a:solidFill>
@@ -1993,14 +1993,84 @@
               <a:t> </a:t>
             </a:r>
             <a:r>
-              <a:rPr sz="1800" spc="65" dirty="0">
+              <a:rPr lang="es-AR" sz="1800" spc="65">
                 <a:solidFill>
                   <a:srgbClr val="FFFFFF"/>
                 </a:solidFill>
                 <a:latin typeface="Trebuchet MS"/>
                 <a:cs typeface="Trebuchet MS"/>
               </a:rPr>
-              <a:t>3</a:t>
+              <a:t>1</a:t>
+            </a:r>
+            <a:r>
+              <a:rPr sz="1800" spc="-100">
+                <a:solidFill>
+                  <a:srgbClr val="FFFFFF"/>
+                </a:solidFill>
+                <a:latin typeface="Trebuchet MS"/>
+                <a:cs typeface="Trebuchet MS"/>
+              </a:rPr>
+              <a:t> </a:t>
+            </a:r>
+            <a:r>
+              <a:rPr sz="1800" spc="-165" dirty="0">
+                <a:solidFill>
+                  <a:srgbClr val="FFFFFF"/>
+                </a:solidFill>
+                <a:latin typeface="Trebuchet MS"/>
+                <a:cs typeface="Trebuchet MS"/>
+              </a:rPr>
+              <a:t>-</a:t>
+            </a:r>
+            <a:r>
+              <a:rPr sz="1800" spc="-105" dirty="0">
+                <a:solidFill>
+                  <a:srgbClr val="FFFFFF"/>
+                </a:solidFill>
+                <a:latin typeface="Trebuchet MS"/>
+                <a:cs typeface="Trebuchet MS"/>
+              </a:rPr>
+              <a:t> </a:t>
+            </a:r>
+            <a:r>
+              <a:rPr sz="1800" spc="-65" dirty="0">
+                <a:solidFill>
+                  <a:srgbClr val="FFFFFF"/>
+                </a:solidFill>
+                <a:latin typeface="Trebuchet MS"/>
+                <a:cs typeface="Trebuchet MS"/>
+              </a:rPr>
+              <a:t>Int</a:t>
+            </a:r>
+            <a:r>
+              <a:rPr sz="1800" spc="-75" dirty="0">
+                <a:solidFill>
+                  <a:srgbClr val="FFFFFF"/>
+                </a:solidFill>
+                <a:latin typeface="Trebuchet MS"/>
+                <a:cs typeface="Trebuchet MS"/>
+              </a:rPr>
+              <a:t>r</a:t>
+            </a:r>
+            <a:r>
+              <a:rPr sz="1800" spc="15" dirty="0">
+                <a:solidFill>
+                  <a:srgbClr val="FFFFFF"/>
+                </a:solidFill>
+                <a:latin typeface="Trebuchet MS"/>
+                <a:cs typeface="Trebuchet MS"/>
+              </a:rPr>
+              <a:t>oducció</a:t>
+            </a:r>
+            <a:r>
+              <a:rPr sz="1800" spc="20" dirty="0">
+                <a:solidFill>
+                  <a:srgbClr val="FFFFFF"/>
+                </a:solidFill>
+                <a:latin typeface="Trebuchet MS"/>
+                <a:cs typeface="Trebuchet MS"/>
+              </a:rPr>
+              <a:t>n</a:t>
             </a:r>
             <a:r>
               <a:rPr sz="1800" spc="-100" dirty="0">
@@ -2013,14 +2083,54 @@
               <a:t> </a:t>
             </a:r>
             <a:r>
-              <a:rPr sz="1800" spc="-165" dirty="0">
+              <a:rPr sz="1800" spc="-40" dirty="0">
                 <a:solidFill>
                   <a:srgbClr val="FFFFFF"/>
                 </a:solidFill>
                 <a:latin typeface="Trebuchet MS"/>
                 <a:cs typeface="Trebuchet MS"/>
               </a:rPr>
-              <a:t>-</a:t>
+              <a:t>y</a:t>
+            </a:r>
+            <a:r>
+              <a:rPr sz="1800" spc="-100" dirty="0">
+                <a:solidFill>
+                  <a:srgbClr val="FFFFFF"/>
+                </a:solidFill>
+                <a:latin typeface="Trebuchet MS"/>
+                <a:cs typeface="Trebuchet MS"/>
+              </a:rPr>
+              <a:t> </a:t>
+            </a:r>
+            <a:r>
+              <a:rPr sz="1800" spc="-60" dirty="0">
+                <a:solidFill>
+                  <a:srgbClr val="FFFFFF"/>
+                </a:solidFill>
+                <a:latin typeface="Trebuchet MS"/>
+                <a:cs typeface="Trebuchet MS"/>
+              </a:rPr>
+              <a:t>her</a:t>
+            </a:r>
+            <a:r>
+              <a:rPr sz="1800" spc="-85" dirty="0">
+                <a:solidFill>
+                  <a:srgbClr val="FFFFFF"/>
+                </a:solidFill>
+                <a:latin typeface="Trebuchet MS"/>
+                <a:cs typeface="Trebuchet MS"/>
+              </a:rPr>
+              <a:t>r</a:t>
+            </a:r>
+            <a:r>
+              <a:rPr sz="1800" spc="10" dirty="0">
+                <a:solidFill>
+                  <a:srgbClr val="FFFFFF"/>
+                </a:solidFill>
+                <a:latin typeface="Trebuchet MS"/>
+                <a:cs typeface="Trebuchet MS"/>
+              </a:rPr>
+              <a:t>amientas</a:t>
             </a:r>
             <a:r>
               <a:rPr sz="1800" spc="-105" dirty="0">
@@ -2033,156 +2143,46 @@
               <a:t> </a:t>
             </a:r>
             <a:r>
-              <a:rPr sz="1800" spc="-65" dirty="0">
+              <a:rPr sz="1800" spc="-15" dirty="0">
                 <a:solidFill>
                   <a:srgbClr val="FFFFFF"/>
                 </a:solidFill>
                 <a:latin typeface="Trebuchet MS"/>
                 <a:cs typeface="Trebuchet MS"/>
               </a:rPr>
-              <a:t>Int</a:t>
-            </a:r>
-            <a:r>
-              <a:rPr sz="1800" spc="-75" dirty="0">
+              <a:t>d</a:t>
+            </a:r>
+            <a:r>
+              <a:rPr sz="1800" spc="-10" dirty="0">
                 <a:solidFill>
                   <a:srgbClr val="FFFFFF"/>
                 </a:solidFill>
                 <a:latin typeface="Trebuchet MS"/>
                 <a:cs typeface="Trebuchet MS"/>
               </a:rPr>
-              <a:t>r</a:t>
-            </a:r>
-            <a:r>
-              <a:rPr sz="1800" spc="15" dirty="0">
+              <a:t>e</a:t>
+            </a:r>
+            <a:r>
+              <a:rPr sz="1800" spc="-105" dirty="0">
                 <a:solidFill>
                   <a:srgbClr val="FFFFFF"/>
                 </a:solidFill>
                 <a:latin typeface="Trebuchet MS"/>
                 <a:cs typeface="Trebuchet MS"/>
               </a:rPr>
-              <a:t>oducció</a:t>
-            </a:r>
-            <a:r>
-              <a:rPr sz="1800" spc="20" dirty="0">
+              <a:t> </a:t>
+            </a:r>
+            <a:r>
+              <a:rPr sz="1800" spc="125" dirty="0">
                 <a:solidFill>
                   <a:srgbClr val="FFFFFF"/>
                 </a:solidFill>
                 <a:latin typeface="Trebuchet MS"/>
                 <a:cs typeface="Trebuchet MS"/>
               </a:rPr>
-              <a:t>n</a:t>
-            </a:r>
-            <a:r>
-              <a:rPr sz="1800" spc="-100" dirty="0">
-                <a:solidFill>
-                  <a:srgbClr val="FFFFFF"/>
-                </a:solidFill>
-                <a:latin typeface="Trebuchet MS"/>
-                <a:cs typeface="Trebuchet MS"/>
-              </a:rPr>
-              <a:t> </a:t>
-            </a:r>
-            <a:r>
-              <a:rPr sz="1800" spc="-40" dirty="0">
-                <a:solidFill>
-                  <a:srgbClr val="FFFFFF"/>
-                </a:solidFill>
-                <a:latin typeface="Trebuchet MS"/>
-                <a:cs typeface="Trebuchet MS"/>
-              </a:rPr>
-              <a:t>y</a:t>
-            </a:r>
-            <a:r>
-              <a:rPr sz="1800" spc="-100" dirty="0">
-                <a:solidFill>
-                  <a:srgbClr val="FFFFFF"/>
-                </a:solidFill>
-                <a:latin typeface="Trebuchet MS"/>
-                <a:cs typeface="Trebuchet MS"/>
-              </a:rPr>
-              <a:t> </a:t>
-            </a:r>
-            <a:r>
-              <a:rPr sz="1800" spc="-60" dirty="0">
-                <a:solidFill>
-                  <a:srgbClr val="FFFFFF"/>
-                </a:solidFill>
-                <a:latin typeface="Trebuchet MS"/>
-                <a:cs typeface="Trebuchet MS"/>
-              </a:rPr>
-              <a:t>her</a:t>
-            </a:r>
-            <a:r>
-              <a:rPr sz="1800" spc="-85" dirty="0">
-                <a:solidFill>
-                  <a:srgbClr val="FFFFFF"/>
-                </a:solidFill>
-                <a:latin typeface="Trebuchet MS"/>
-                <a:cs typeface="Trebuchet MS"/>
-              </a:rPr>
-              <a:t>r</a:t>
-            </a:r>
-            <a:r>
-              <a:rPr sz="1800" spc="10" dirty="0">
-                <a:solidFill>
-                  <a:srgbClr val="FFFFFF"/>
-                </a:solidFill>
-                <a:latin typeface="Trebuchet MS"/>
-                <a:cs typeface="Trebuchet MS"/>
-              </a:rPr>
-              <a:t>amientas</a:t>
-            </a:r>
-            <a:r>
-              <a:rPr sz="1800" spc="-105" dirty="0">
-                <a:solidFill>
-                  <a:srgbClr val="FFFFFF"/>
-                </a:solidFill>
-                <a:latin typeface="Trebuchet MS"/>
-                <a:cs typeface="Trebuchet MS"/>
-              </a:rPr>
-              <a:t> </a:t>
-            </a:r>
-            <a:r>
-              <a:rPr sz="1800" spc="-15" dirty="0">
-                <a:solidFill>
-                  <a:srgbClr val="FFFFFF"/>
-                </a:solidFill>
-                <a:latin typeface="Trebuchet MS"/>
-                <a:cs typeface="Trebuchet MS"/>
-              </a:rPr>
-              <a:t>d</a:t>
-            </a:r>
-            <a:r>
-              <a:rPr sz="1800" spc="-10" dirty="0">
-                <a:solidFill>
-                  <a:srgbClr val="FFFFFF"/>
-                </a:solidFill>
-                <a:latin typeface="Trebuchet MS"/>
-                <a:cs typeface="Trebuchet MS"/>
-              </a:rPr>
-              <a:t>e</a:t>
-            </a:r>
-            <a:r>
-              <a:rPr sz="1800" spc="-105" dirty="0">
-                <a:solidFill>
-                  <a:srgbClr val="FFFFFF"/>
-                </a:solidFill>
-                <a:latin typeface="Trebuchet MS"/>
-                <a:cs typeface="Trebuchet MS"/>
-              </a:rPr>
-              <a:t> </a:t>
-            </a:r>
-            <a:r>
-              <a:rPr sz="1800" spc="125" dirty="0">
-                <a:solidFill>
-                  <a:srgbClr val="FFFFFF"/>
-                </a:solidFill>
-                <a:latin typeface="Trebuchet MS"/>
-                <a:cs typeface="Trebuchet MS"/>
-              </a:rPr>
               <a:t>SW</a:t>
             </a:r>
-            <a:endParaRPr sz="1800">
+            <a:endParaRPr sz="1800" dirty="0">
               <a:latin typeface="Trebuchet MS"/>
               <a:cs typeface="Trebuchet MS"/>
             </a:endParaRPr>
@@ -9424,7 +9424,7 @@
         <p:spPr>
           <a:xfrm>
             <a:off x="544925" y="1733550"/>
-            <a:ext cx="7529195" cy="3287118"/>
+            <a:ext cx="7529195" cy="1630254"/>
           </a:xfrm>
           <a:prstGeom prst="rect">
             <a:avLst/>
@@ -9435,131 +9435,6 @@
             <a:spAutoFit/>
           </a:bodyPr>
           <a:lstStyle/>
-          <a:p>
-            <a:pPr marL="298450" marR="5080" indent="-285750">
-              <a:lnSpc>
-                <a:spcPct val="114999"/>
-              </a:lnSpc>
-              <a:spcBef>
-                <a:spcPts val="100"/>
-              </a:spcBef>
-              <a:buFont typeface="Arial" panose="020B0604020202020204" pitchFamily="34" charset="0"/>
-              <a:buChar char="•"/>
-              <a:tabLst>
-                <a:tab pos="132080" algn="l"/>
-              </a:tabLst>
-            </a:pPr>
-            <a:r>
-              <a:rPr lang="es-AR" sz="1800" spc="125" dirty="0">
-                <a:solidFill>
-                  <a:srgbClr val="737373"/>
-                </a:solidFill>
-                <a:latin typeface="Trebuchet MS"/>
-                <a:cs typeface="Trebuchet MS"/>
-              </a:rPr>
-              <a:t>Magdalena Bouza</a:t>
-            </a:r>
-          </a:p>
-          <a:p>
-            <a:pPr marL="755650" marR="5080" lvl="1" indent="-285750">
-              <a:lnSpc>
-                <a:spcPct val="114999"/>
-              </a:lnSpc>
-              <a:spcBef>
-                <a:spcPts val="100"/>
-              </a:spcBef>
-              <a:buFont typeface="Arial" panose="020B0604020202020204" pitchFamily="34" charset="0"/>
-              <a:buChar char="•"/>
-              <a:tabLst>
-                <a:tab pos="132080" algn="l"/>
-              </a:tabLst>
-            </a:pPr>
-            <a:r>
-              <a:rPr lang="es-AR" spc="125" dirty="0">
-                <a:solidFill>
-                  <a:srgbClr val="737373"/>
-                </a:solidFill>
-                <a:latin typeface="Trebuchet MS"/>
-                <a:cs typeface="Trebuchet MS"/>
-              </a:rPr>
-              <a:t>Ingeniera Electrónica, FIUBA</a:t>
-            </a:r>
-          </a:p>
-          <a:p>
-            <a:pPr marL="755650" marR="5080" lvl="1" indent="-285750">
-              <a:lnSpc>
-                <a:spcPct val="114999"/>
-              </a:lnSpc>
-              <a:spcBef>
-                <a:spcPts val="100"/>
-              </a:spcBef>
-              <a:buFont typeface="Arial" panose="020B0604020202020204" pitchFamily="34" charset="0"/>
-              <a:buChar char="•"/>
-              <a:tabLst>
-                <a:tab pos="132080" algn="l"/>
-              </a:tabLst>
-            </a:pPr>
-            <a:r>
-              <a:rPr lang="es-AR" spc="125" dirty="0">
-                <a:solidFill>
-                  <a:srgbClr val="737373"/>
-                </a:solidFill>
-                <a:latin typeface="Trebuchet MS"/>
-                <a:cs typeface="Trebuchet MS"/>
-              </a:rPr>
-              <a:t>Doctor en Ingeniería Electrónica, FIUBA</a:t>
-            </a:r>
-          </a:p>
-          <a:p>
-            <a:pPr marL="755650" marR="5080" lvl="1" indent="-285750">
-              <a:lnSpc>
-                <a:spcPct val="114999"/>
-              </a:lnSpc>
-              <a:spcBef>
-                <a:spcPts val="100"/>
-              </a:spcBef>
-              <a:buFont typeface="Arial" panose="020B0604020202020204" pitchFamily="34" charset="0"/>
-              <a:buChar char="•"/>
-              <a:tabLst>
-                <a:tab pos="132080" algn="l"/>
-              </a:tabLst>
-            </a:pPr>
-            <a:r>
-              <a:rPr lang="es-AR" spc="125" dirty="0">
-                <a:solidFill>
-                  <a:srgbClr val="737373"/>
-                </a:solidFill>
-                <a:latin typeface="Trebuchet MS"/>
-                <a:cs typeface="Trebuchet MS"/>
-              </a:rPr>
-              <a:t>Contacto:</a:t>
-            </a:r>
-          </a:p>
-          <a:p>
-            <a:pPr marL="1212850" marR="5080" lvl="2" indent="-285750">
-              <a:lnSpc>
-                <a:spcPct val="114999"/>
-              </a:lnSpc>
-              <a:spcBef>
-                <a:spcPts val="100"/>
-              </a:spcBef>
-              <a:buFont typeface="Arial" panose="020B0604020202020204" pitchFamily="34" charset="0"/>
-              <a:buChar char="•"/>
-              <a:tabLst>
-                <a:tab pos="132080" algn="l"/>
-              </a:tabLst>
-            </a:pPr>
-            <a:r>
-              <a:rPr lang="es-AR" spc="125" dirty="0">
-                <a:solidFill>
-                  <a:srgbClr val="737373"/>
-                </a:solidFill>
-                <a:latin typeface="Trebuchet MS"/>
-                <a:cs typeface="Trebuchet MS"/>
-              </a:rPr>
-              <a:t>Email: magdalena.bouza@gmail.com</a:t>
-            </a:r>
-          </a:p>
           <a:p>
             <a:pPr marL="298450" marR="5080" indent="-285750">
               <a:lnSpc>

</xml_diff>